<commit_message>
tidying weeks 1-4, building up Weeks 6-8
</commit_message>
<xml_diff>
--- a/Week_7/Clustering.pptx
+++ b/Week_7/Clustering.pptx
@@ -9,8 +9,9 @@
     <p:sldId id="258" r:id="rId3"/>
     <p:sldId id="257" r:id="rId4"/>
     <p:sldId id="259" r:id="rId5"/>
-    <p:sldId id="260" r:id="rId6"/>
-    <p:sldId id="261" r:id="rId7"/>
+    <p:sldId id="262" r:id="rId6"/>
+    <p:sldId id="260" r:id="rId7"/>
+    <p:sldId id="261" r:id="rId8"/>
   </p:sldIdLst>
   <p:sldSz cx="12192000" cy="6858000"/>
   <p:notesSz cx="6858000" cy="9144000"/>
@@ -109,7 +110,260 @@
       </a:defRPr>
     </a:lvl9pPr>
   </p:defaultTextStyle>
+  <p:extLst>
+    <p:ext uri="{EFAFB233-063F-42B5-8137-9DF3F51BA10A}">
+      <p15:sldGuideLst xmlns:p15="http://schemas.microsoft.com/office/powerpoint/2012/main"/>
+    </p:ext>
+  </p:extLst>
 </p:presentation>
+</file>
+
+<file path=ppt/changesInfos/changesInfo1.xml><?xml version="1.0" encoding="utf-8"?>
+<pc:chgInfo xmlns:a="http://schemas.openxmlformats.org/drawingml/2006/main" xmlns:r="http://schemas.openxmlformats.org/officeDocument/2006/relationships" xmlns:ac="http://schemas.microsoft.com/office/drawing/2013/main/command" xmlns:pc="http://schemas.microsoft.com/office/powerpoint/2013/main/command">
+  <pc:docChgLst>
+    <pc:chgData name="Catherine Kidner" userId="05772faa-c547-42bd-a4f8-01ff9d39ffcc" providerId="ADAL" clId="{ADA74E94-549B-D54F-B2FE-30F919BE5E11}"/>
+    <pc:docChg chg="custSel addSld modSld">
+      <pc:chgData name="Catherine Kidner" userId="05772faa-c547-42bd-a4f8-01ff9d39ffcc" providerId="ADAL" clId="{ADA74E94-549B-D54F-B2FE-30F919BE5E11}" dt="2023-02-17T12:30:10.254" v="676" actId="1076"/>
+      <pc:docMkLst>
+        <pc:docMk/>
+      </pc:docMkLst>
+      <pc:sldChg chg="addSp modSp mod">
+        <pc:chgData name="Catherine Kidner" userId="05772faa-c547-42bd-a4f8-01ff9d39ffcc" providerId="ADAL" clId="{ADA74E94-549B-D54F-B2FE-30F919BE5E11}" dt="2023-02-17T12:29:20.866" v="655" actId="113"/>
+        <pc:sldMkLst>
+          <pc:docMk/>
+          <pc:sldMk cId="1688735850" sldId="256"/>
+        </pc:sldMkLst>
+        <pc:spChg chg="mod">
+          <ac:chgData name="Catherine Kidner" userId="05772faa-c547-42bd-a4f8-01ff9d39ffcc" providerId="ADAL" clId="{ADA74E94-549B-D54F-B2FE-30F919BE5E11}" dt="2023-02-17T12:29:20.866" v="655" actId="113"/>
+          <ac:spMkLst>
+            <pc:docMk/>
+            <pc:sldMk cId="1688735850" sldId="256"/>
+            <ac:spMk id="2" creationId="{D78860AF-598F-4D95-C30E-8C2C292C6905}"/>
+          </ac:spMkLst>
+        </pc:spChg>
+        <pc:spChg chg="mod">
+          <ac:chgData name="Catherine Kidner" userId="05772faa-c547-42bd-a4f8-01ff9d39ffcc" providerId="ADAL" clId="{ADA74E94-549B-D54F-B2FE-30F919BE5E11}" dt="2023-02-17T12:29:09.698" v="651" actId="1076"/>
+          <ac:spMkLst>
+            <pc:docMk/>
+            <pc:sldMk cId="1688735850" sldId="256"/>
+            <ac:spMk id="3" creationId="{EE775A04-2C3C-C0E0-8072-B70AF4FFAE1A}"/>
+          </ac:spMkLst>
+        </pc:spChg>
+        <pc:picChg chg="add mod">
+          <ac:chgData name="Catherine Kidner" userId="05772faa-c547-42bd-a4f8-01ff9d39ffcc" providerId="ADAL" clId="{ADA74E94-549B-D54F-B2FE-30F919BE5E11}" dt="2023-02-17T12:29:17.760" v="653" actId="1076"/>
+          <ac:picMkLst>
+            <pc:docMk/>
+            <pc:sldMk cId="1688735850" sldId="256"/>
+            <ac:picMk id="3074" creationId="{FA892ECA-CC8A-9280-6004-037E618335AC}"/>
+          </ac:picMkLst>
+        </pc:picChg>
+        <pc:picChg chg="add mod">
+          <ac:chgData name="Catherine Kidner" userId="05772faa-c547-42bd-a4f8-01ff9d39ffcc" providerId="ADAL" clId="{ADA74E94-549B-D54F-B2FE-30F919BE5E11}" dt="2023-02-17T12:29:05.843" v="650" actId="14100"/>
+          <ac:picMkLst>
+            <pc:docMk/>
+            <pc:sldMk cId="1688735850" sldId="256"/>
+            <ac:picMk id="3076" creationId="{48C2F6D1-5274-04AC-5120-EAEAB9C6A55E}"/>
+          </ac:picMkLst>
+        </pc:picChg>
+      </pc:sldChg>
+      <pc:sldChg chg="modSp mod">
+        <pc:chgData name="Catherine Kidner" userId="05772faa-c547-42bd-a4f8-01ff9d39ffcc" providerId="ADAL" clId="{ADA74E94-549B-D54F-B2FE-30F919BE5E11}" dt="2023-02-17T12:29:43.993" v="661" actId="403"/>
+        <pc:sldMkLst>
+          <pc:docMk/>
+          <pc:sldMk cId="2901050308" sldId="257"/>
+        </pc:sldMkLst>
+        <pc:spChg chg="mod">
+          <ac:chgData name="Catherine Kidner" userId="05772faa-c547-42bd-a4f8-01ff9d39ffcc" providerId="ADAL" clId="{ADA74E94-549B-D54F-B2FE-30F919BE5E11}" dt="2023-02-17T12:29:43.993" v="661" actId="403"/>
+          <ac:spMkLst>
+            <pc:docMk/>
+            <pc:sldMk cId="2901050308" sldId="257"/>
+            <ac:spMk id="9" creationId="{7C707F56-3D69-B9A5-33DE-B6733287D748}"/>
+          </ac:spMkLst>
+        </pc:spChg>
+      </pc:sldChg>
+      <pc:sldChg chg="modSp mod">
+        <pc:chgData name="Catherine Kidner" userId="05772faa-c547-42bd-a4f8-01ff9d39ffcc" providerId="ADAL" clId="{ADA74E94-549B-D54F-B2FE-30F919BE5E11}" dt="2023-02-17T12:29:30.695" v="659" actId="1076"/>
+        <pc:sldMkLst>
+          <pc:docMk/>
+          <pc:sldMk cId="3109642548" sldId="258"/>
+        </pc:sldMkLst>
+        <pc:spChg chg="mod">
+          <ac:chgData name="Catherine Kidner" userId="05772faa-c547-42bd-a4f8-01ff9d39ffcc" providerId="ADAL" clId="{ADA74E94-549B-D54F-B2FE-30F919BE5E11}" dt="2023-02-17T12:29:30.695" v="659" actId="1076"/>
+          <ac:spMkLst>
+            <pc:docMk/>
+            <pc:sldMk cId="3109642548" sldId="258"/>
+            <ac:spMk id="9" creationId="{E89D9487-5646-3834-56A5-84885852F028}"/>
+          </ac:spMkLst>
+        </pc:spChg>
+      </pc:sldChg>
+      <pc:sldChg chg="addSp delSp modSp mod">
+        <pc:chgData name="Catherine Kidner" userId="05772faa-c547-42bd-a4f8-01ff9d39ffcc" providerId="ADAL" clId="{ADA74E94-549B-D54F-B2FE-30F919BE5E11}" dt="2023-02-17T11:57:47.510" v="133" actId="1076"/>
+        <pc:sldMkLst>
+          <pc:docMk/>
+          <pc:sldMk cId="452910662" sldId="259"/>
+        </pc:sldMkLst>
+        <pc:spChg chg="add mod">
+          <ac:chgData name="Catherine Kidner" userId="05772faa-c547-42bd-a4f8-01ff9d39ffcc" providerId="ADAL" clId="{ADA74E94-549B-D54F-B2FE-30F919BE5E11}" dt="2023-02-17T11:57:31.061" v="128" actId="1076"/>
+          <ac:spMkLst>
+            <pc:docMk/>
+            <pc:sldMk cId="452910662" sldId="259"/>
+            <ac:spMk id="3" creationId="{04C23480-B9C4-28D6-4E38-A91D8D24D8B5}"/>
+          </ac:spMkLst>
+        </pc:spChg>
+        <pc:spChg chg="mod">
+          <ac:chgData name="Catherine Kidner" userId="05772faa-c547-42bd-a4f8-01ff9d39ffcc" providerId="ADAL" clId="{ADA74E94-549B-D54F-B2FE-30F919BE5E11}" dt="2023-02-17T11:54:52.279" v="121" actId="1076"/>
+          <ac:spMkLst>
+            <pc:docMk/>
+            <pc:sldMk cId="452910662" sldId="259"/>
+            <ac:spMk id="4" creationId="{D38D98AB-AAFD-BAF2-36D0-84E5BE9FFD03}"/>
+          </ac:spMkLst>
+        </pc:spChg>
+        <pc:spChg chg="add mod">
+          <ac:chgData name="Catherine Kidner" userId="05772faa-c547-42bd-a4f8-01ff9d39ffcc" providerId="ADAL" clId="{ADA74E94-549B-D54F-B2FE-30F919BE5E11}" dt="2023-02-17T11:57:47.510" v="133" actId="1076"/>
+          <ac:spMkLst>
+            <pc:docMk/>
+            <pc:sldMk cId="452910662" sldId="259"/>
+            <ac:spMk id="5" creationId="{B5694F07-286F-F49C-F554-9D5BB396EDF4}"/>
+          </ac:spMkLst>
+        </pc:spChg>
+        <pc:picChg chg="add del mod">
+          <ac:chgData name="Catherine Kidner" userId="05772faa-c547-42bd-a4f8-01ff9d39ffcc" providerId="ADAL" clId="{ADA74E94-549B-D54F-B2FE-30F919BE5E11}" dt="2023-02-17T10:56:55.053" v="99" actId="478"/>
+          <ac:picMkLst>
+            <pc:docMk/>
+            <pc:sldMk cId="452910662" sldId="259"/>
+            <ac:picMk id="1026" creationId="{6661AA92-C88D-AA74-CE16-4C19877F13FE}"/>
+          </ac:picMkLst>
+        </pc:picChg>
+        <pc:picChg chg="add del mod">
+          <ac:chgData name="Catherine Kidner" userId="05772faa-c547-42bd-a4f8-01ff9d39ffcc" providerId="ADAL" clId="{ADA74E94-549B-D54F-B2FE-30F919BE5E11}" dt="2023-02-17T10:56:56.012" v="100" actId="478"/>
+          <ac:picMkLst>
+            <pc:docMk/>
+            <pc:sldMk cId="452910662" sldId="259"/>
+            <ac:picMk id="1028" creationId="{36B9981B-26BB-7271-916C-D6A06E487B9C}"/>
+          </ac:picMkLst>
+        </pc:picChg>
+        <pc:picChg chg="add mod">
+          <ac:chgData name="Catherine Kidner" userId="05772faa-c547-42bd-a4f8-01ff9d39ffcc" providerId="ADAL" clId="{ADA74E94-549B-D54F-B2FE-30F919BE5E11}" dt="2023-02-17T11:54:57.179" v="124" actId="1076"/>
+          <ac:picMkLst>
+            <pc:docMk/>
+            <pc:sldMk cId="452910662" sldId="259"/>
+            <ac:picMk id="1030" creationId="{794896BE-7BE2-63AC-B7C2-03142722267A}"/>
+          </ac:picMkLst>
+        </pc:picChg>
+        <pc:picChg chg="add del mod">
+          <ac:chgData name="Catherine Kidner" userId="05772faa-c547-42bd-a4f8-01ff9d39ffcc" providerId="ADAL" clId="{ADA74E94-549B-D54F-B2FE-30F919BE5E11}" dt="2023-02-17T11:54:55.441" v="123" actId="478"/>
+          <ac:picMkLst>
+            <pc:docMk/>
+            <pc:sldMk cId="452910662" sldId="259"/>
+            <ac:picMk id="1032" creationId="{00E635CB-1C11-C577-CDF3-18A4FA8CFD54}"/>
+          </ac:picMkLst>
+        </pc:picChg>
+      </pc:sldChg>
+      <pc:sldChg chg="addSp modSp mod">
+        <pc:chgData name="Catherine Kidner" userId="05772faa-c547-42bd-a4f8-01ff9d39ffcc" providerId="ADAL" clId="{ADA74E94-549B-D54F-B2FE-30F919BE5E11}" dt="2023-02-17T12:30:10.254" v="676" actId="1076"/>
+        <pc:sldMkLst>
+          <pc:docMk/>
+          <pc:sldMk cId="507502332" sldId="261"/>
+        </pc:sldMkLst>
+        <pc:spChg chg="add mod">
+          <ac:chgData name="Catherine Kidner" userId="05772faa-c547-42bd-a4f8-01ff9d39ffcc" providerId="ADAL" clId="{ADA74E94-549B-D54F-B2FE-30F919BE5E11}" dt="2023-02-17T10:54:23.715" v="81" actId="1076"/>
+          <ac:spMkLst>
+            <pc:docMk/>
+            <pc:sldMk cId="507502332" sldId="261"/>
+            <ac:spMk id="2" creationId="{5E4BFE8A-6F7C-282A-5C1E-71FE52CFD128}"/>
+          </ac:spMkLst>
+        </pc:spChg>
+        <pc:spChg chg="mod">
+          <ac:chgData name="Catherine Kidner" userId="05772faa-c547-42bd-a4f8-01ff9d39ffcc" providerId="ADAL" clId="{ADA74E94-549B-D54F-B2FE-30F919BE5E11}" dt="2023-02-17T12:30:10.254" v="676" actId="1076"/>
+          <ac:spMkLst>
+            <pc:docMk/>
+            <pc:sldMk cId="507502332" sldId="261"/>
+            <ac:spMk id="4" creationId="{81E853CF-E60F-4E6D-E320-E084BDCE7B9D}"/>
+          </ac:spMkLst>
+        </pc:spChg>
+        <pc:spChg chg="mod">
+          <ac:chgData name="Catherine Kidner" userId="05772faa-c547-42bd-a4f8-01ff9d39ffcc" providerId="ADAL" clId="{ADA74E94-549B-D54F-B2FE-30F919BE5E11}" dt="2023-02-17T10:53:59.869" v="24" actId="1076"/>
+          <ac:spMkLst>
+            <pc:docMk/>
+            <pc:sldMk cId="507502332" sldId="261"/>
+            <ac:spMk id="5" creationId="{96F9AEB0-EC3C-F9D0-B2CC-30B6CF8CB4B5}"/>
+          </ac:spMkLst>
+        </pc:spChg>
+      </pc:sldChg>
+      <pc:sldChg chg="addSp delSp modSp new mod">
+        <pc:chgData name="Catherine Kidner" userId="05772faa-c547-42bd-a4f8-01ff9d39ffcc" providerId="ADAL" clId="{ADA74E94-549B-D54F-B2FE-30F919BE5E11}" dt="2023-02-17T12:24:24.145" v="627" actId="1076"/>
+        <pc:sldMkLst>
+          <pc:docMk/>
+          <pc:sldMk cId="1641295863" sldId="262"/>
+        </pc:sldMkLst>
+        <pc:spChg chg="del">
+          <ac:chgData name="Catherine Kidner" userId="05772faa-c547-42bd-a4f8-01ff9d39ffcc" providerId="ADAL" clId="{ADA74E94-549B-D54F-B2FE-30F919BE5E11}" dt="2023-02-17T11:58:02.917" v="136" actId="478"/>
+          <ac:spMkLst>
+            <pc:docMk/>
+            <pc:sldMk cId="1641295863" sldId="262"/>
+            <ac:spMk id="2" creationId="{B9A9D113-EF93-730B-5004-4107F87AA98A}"/>
+          </ac:spMkLst>
+        </pc:spChg>
+        <pc:spChg chg="del">
+          <ac:chgData name="Catherine Kidner" userId="05772faa-c547-42bd-a4f8-01ff9d39ffcc" providerId="ADAL" clId="{ADA74E94-549B-D54F-B2FE-30F919BE5E11}" dt="2023-02-17T11:58:04.975" v="137" actId="478"/>
+          <ac:spMkLst>
+            <pc:docMk/>
+            <pc:sldMk cId="1641295863" sldId="262"/>
+            <ac:spMk id="3" creationId="{D9F6B6F5-36F2-4D5A-138C-473593E51E35}"/>
+          </ac:spMkLst>
+        </pc:spChg>
+        <pc:spChg chg="add mod">
+          <ac:chgData name="Catherine Kidner" userId="05772faa-c547-42bd-a4f8-01ff9d39ffcc" providerId="ADAL" clId="{ADA74E94-549B-D54F-B2FE-30F919BE5E11}" dt="2023-02-17T12:24:24.145" v="627" actId="1076"/>
+          <ac:spMkLst>
+            <pc:docMk/>
+            <pc:sldMk cId="1641295863" sldId="262"/>
+            <ac:spMk id="4" creationId="{457D7EF3-A65F-3271-E8E8-0CC3FEE2DC68}"/>
+          </ac:spMkLst>
+        </pc:spChg>
+        <pc:spChg chg="add mod">
+          <ac:chgData name="Catherine Kidner" userId="05772faa-c547-42bd-a4f8-01ff9d39ffcc" providerId="ADAL" clId="{ADA74E94-549B-D54F-B2FE-30F919BE5E11}" dt="2023-02-17T12:15:22.557" v="565" actId="1076"/>
+          <ac:spMkLst>
+            <pc:docMk/>
+            <pc:sldMk cId="1641295863" sldId="262"/>
+            <ac:spMk id="5" creationId="{815F0A58-3DE8-DC8F-427C-F3E5952A26D6}"/>
+          </ac:spMkLst>
+        </pc:spChg>
+        <pc:spChg chg="add mod">
+          <ac:chgData name="Catherine Kidner" userId="05772faa-c547-42bd-a4f8-01ff9d39ffcc" providerId="ADAL" clId="{ADA74E94-549B-D54F-B2FE-30F919BE5E11}" dt="2023-02-17T12:23:36.221" v="623" actId="20577"/>
+          <ac:spMkLst>
+            <pc:docMk/>
+            <pc:sldMk cId="1641295863" sldId="262"/>
+            <ac:spMk id="6" creationId="{07276EBD-2A90-45A3-7094-A500FA51230B}"/>
+          </ac:spMkLst>
+        </pc:spChg>
+        <pc:spChg chg="add mod">
+          <ac:chgData name="Catherine Kidner" userId="05772faa-c547-42bd-a4f8-01ff9d39ffcc" providerId="ADAL" clId="{ADA74E94-549B-D54F-B2FE-30F919BE5E11}" dt="2023-02-17T12:15:38.870" v="591" actId="1036"/>
+          <ac:spMkLst>
+            <pc:docMk/>
+            <pc:sldMk cId="1641295863" sldId="262"/>
+            <ac:spMk id="7" creationId="{F177C822-CAC3-B39E-37DB-F9B9B0C1C797}"/>
+          </ac:spMkLst>
+        </pc:spChg>
+        <pc:spChg chg="add mod">
+          <ac:chgData name="Catherine Kidner" userId="05772faa-c547-42bd-a4f8-01ff9d39ffcc" providerId="ADAL" clId="{ADA74E94-549B-D54F-B2FE-30F919BE5E11}" dt="2023-02-17T12:18:37.981" v="611" actId="20577"/>
+          <ac:spMkLst>
+            <pc:docMk/>
+            <pc:sldMk cId="1641295863" sldId="262"/>
+            <ac:spMk id="8" creationId="{9A18DB13-3327-720B-EFD0-B06B8A874E47}"/>
+          </ac:spMkLst>
+        </pc:spChg>
+        <pc:picChg chg="add mod">
+          <ac:chgData name="Catherine Kidner" userId="05772faa-c547-42bd-a4f8-01ff9d39ffcc" providerId="ADAL" clId="{ADA74E94-549B-D54F-B2FE-30F919BE5E11}" dt="2023-02-17T12:14:21.211" v="550" actId="1076"/>
+          <ac:picMkLst>
+            <pc:docMk/>
+            <pc:sldMk cId="1641295863" sldId="262"/>
+            <ac:picMk id="2050" creationId="{262DC1C3-A68C-4E4A-AF04-EF7E8F3243D5}"/>
+          </ac:picMkLst>
+        </pc:picChg>
+      </pc:sldChg>
+    </pc:docChg>
+  </pc:docChgLst>
+</pc:chgInfo>
 </file>
 
 <file path=ppt/slideLayouts/slideLayout1.xml><?xml version="1.0" encoding="utf-8"?>
@@ -261,7 +515,7 @@
           <a:p>
             <a:fld id="{B0106A28-6AAE-A04C-80CC-6DB336414E93}" type="datetimeFigureOut">
               <a:rPr lang="en-US" smtClean="0"/>
-              <a:t>10/10/22</a:t>
+              <a:t>2/17/23</a:t>
             </a:fld>
             <a:endParaRPr lang="en-US"/>
           </a:p>
@@ -461,7 +715,7 @@
           <a:p>
             <a:fld id="{B0106A28-6AAE-A04C-80CC-6DB336414E93}" type="datetimeFigureOut">
               <a:rPr lang="en-US" smtClean="0"/>
-              <a:t>10/10/22</a:t>
+              <a:t>2/17/23</a:t>
             </a:fld>
             <a:endParaRPr lang="en-US"/>
           </a:p>
@@ -671,7 +925,7 @@
           <a:p>
             <a:fld id="{B0106A28-6AAE-A04C-80CC-6DB336414E93}" type="datetimeFigureOut">
               <a:rPr lang="en-US" smtClean="0"/>
-              <a:t>10/10/22</a:t>
+              <a:t>2/17/23</a:t>
             </a:fld>
             <a:endParaRPr lang="en-US"/>
           </a:p>
@@ -871,7 +1125,7 @@
           <a:p>
             <a:fld id="{B0106A28-6AAE-A04C-80CC-6DB336414E93}" type="datetimeFigureOut">
               <a:rPr lang="en-US" smtClean="0"/>
-              <a:t>10/10/22</a:t>
+              <a:t>2/17/23</a:t>
             </a:fld>
             <a:endParaRPr lang="en-US"/>
           </a:p>
@@ -1147,7 +1401,7 @@
           <a:p>
             <a:fld id="{B0106A28-6AAE-A04C-80CC-6DB336414E93}" type="datetimeFigureOut">
               <a:rPr lang="en-US" smtClean="0"/>
-              <a:t>10/10/22</a:t>
+              <a:t>2/17/23</a:t>
             </a:fld>
             <a:endParaRPr lang="en-US"/>
           </a:p>
@@ -1415,7 +1669,7 @@
           <a:p>
             <a:fld id="{B0106A28-6AAE-A04C-80CC-6DB336414E93}" type="datetimeFigureOut">
               <a:rPr lang="en-US" smtClean="0"/>
-              <a:t>10/10/22</a:t>
+              <a:t>2/17/23</a:t>
             </a:fld>
             <a:endParaRPr lang="en-US"/>
           </a:p>
@@ -1830,7 +2084,7 @@
           <a:p>
             <a:fld id="{B0106A28-6AAE-A04C-80CC-6DB336414E93}" type="datetimeFigureOut">
               <a:rPr lang="en-US" smtClean="0"/>
-              <a:t>10/10/22</a:t>
+              <a:t>2/17/23</a:t>
             </a:fld>
             <a:endParaRPr lang="en-US"/>
           </a:p>
@@ -1972,7 +2226,7 @@
           <a:p>
             <a:fld id="{B0106A28-6AAE-A04C-80CC-6DB336414E93}" type="datetimeFigureOut">
               <a:rPr lang="en-US" smtClean="0"/>
-              <a:t>10/10/22</a:t>
+              <a:t>2/17/23</a:t>
             </a:fld>
             <a:endParaRPr lang="en-US"/>
           </a:p>
@@ -2085,7 +2339,7 @@
           <a:p>
             <a:fld id="{B0106A28-6AAE-A04C-80CC-6DB336414E93}" type="datetimeFigureOut">
               <a:rPr lang="en-US" smtClean="0"/>
-              <a:t>10/10/22</a:t>
+              <a:t>2/17/23</a:t>
             </a:fld>
             <a:endParaRPr lang="en-US"/>
           </a:p>
@@ -2398,7 +2652,7 @@
           <a:p>
             <a:fld id="{B0106A28-6AAE-A04C-80CC-6DB336414E93}" type="datetimeFigureOut">
               <a:rPr lang="en-US" smtClean="0"/>
-              <a:t>10/10/22</a:t>
+              <a:t>2/17/23</a:t>
             </a:fld>
             <a:endParaRPr lang="en-US"/>
           </a:p>
@@ -2687,7 +2941,7 @@
           <a:p>
             <a:fld id="{B0106A28-6AAE-A04C-80CC-6DB336414E93}" type="datetimeFigureOut">
               <a:rPr lang="en-US" smtClean="0"/>
-              <a:t>10/10/22</a:t>
+              <a:t>2/17/23</a:t>
             </a:fld>
             <a:endParaRPr lang="en-US"/>
           </a:p>
@@ -2930,7 +3184,7 @@
           <a:p>
             <a:fld id="{B0106A28-6AAE-A04C-80CC-6DB336414E93}" type="datetimeFigureOut">
               <a:rPr lang="en-US" smtClean="0"/>
-              <a:t>10/10/22</a:t>
+              <a:t>2/17/23</a:t>
             </a:fld>
             <a:endParaRPr lang="en-US"/>
           </a:p>
@@ -3363,14 +3617,19 @@
             <p:ph type="ctrTitle"/>
           </p:nvPr>
         </p:nvSpPr>
-        <p:spPr/>
+        <p:spPr>
+          <a:xfrm>
+            <a:off x="6986604" y="5126445"/>
+            <a:ext cx="4669972" cy="973592"/>
+          </a:xfrm>
+        </p:spPr>
         <p:txBody>
           <a:bodyPr/>
           <a:lstStyle/>
           <a:p>
             <a:r>
-              <a:rPr lang="en-US" dirty="0"/>
-              <a:t>Clustering?</a:t>
+              <a:rPr lang="en-US" b="1" dirty="0"/>
+              <a:t>Clustering</a:t>
             </a:r>
           </a:p>
         </p:txBody>
@@ -3391,7 +3650,12 @@
             <p:ph type="subTitle" idx="1"/>
           </p:nvPr>
         </p:nvSpPr>
-        <p:spPr/>
+        <p:spPr>
+          <a:xfrm>
+            <a:off x="778329" y="691925"/>
+            <a:ext cx="5029200" cy="654276"/>
+          </a:xfrm>
+        </p:spPr>
         <p:txBody>
           <a:bodyPr/>
           <a:lstStyle/>
@@ -3403,6 +3667,98 @@
           </a:p>
         </p:txBody>
       </p:sp>
+      <p:pic>
+        <p:nvPicPr>
+          <p:cNvPr id="3074" name="Picture 2" descr="Kellogg's Crunchy Nut Honey &amp; Nut Clusters Cereal 450g | eBay">
+            <a:extLst>
+              <a:ext uri="{FF2B5EF4-FFF2-40B4-BE49-F238E27FC236}">
+                <a16:creationId xmlns:a16="http://schemas.microsoft.com/office/drawing/2014/main" id="{FA892ECA-CC8A-9280-6004-037E618335AC}"/>
+              </a:ext>
+            </a:extLst>
+          </p:cNvPr>
+          <p:cNvPicPr>
+            <a:picLocks noChangeAspect="1" noChangeArrowheads="1"/>
+          </p:cNvPicPr>
+          <p:nvPr/>
+        </p:nvPicPr>
+        <p:blipFill rotWithShape="1">
+          <a:blip r:embed="rId2">
+            <a:extLst>
+              <a:ext uri="{28A0092B-C50C-407E-A947-70E740481C1C}">
+                <a14:useLocalDpi xmlns:a14="http://schemas.microsoft.com/office/drawing/2010/main" val="0"/>
+              </a:ext>
+            </a:extLst>
+          </a:blip>
+          <a:srcRect l="15008" t="759" r="14503" b="1771"/>
+          <a:stretch/>
+        </p:blipFill>
+        <p:spPr bwMode="auto">
+          <a:xfrm>
+            <a:off x="7758925" y="804817"/>
+            <a:ext cx="3125330" cy="4321628"/>
+          </a:xfrm>
+          <a:prstGeom prst="rect">
+            <a:avLst/>
+          </a:prstGeom>
+          <a:noFill/>
+          <a:extLst>
+            <a:ext uri="{909E8E84-426E-40DD-AFC4-6F175D3DCCD1}">
+              <a14:hiddenFill xmlns:a14="http://schemas.microsoft.com/office/drawing/2010/main">
+                <a:solidFill>
+                  <a:srgbClr val="FFFFFF"/>
+                </a:solidFill>
+              </a14:hiddenFill>
+            </a:ext>
+          </a:extLst>
+        </p:spPr>
+      </p:pic>
+      <p:pic>
+        <p:nvPicPr>
+          <p:cNvPr id="3076" name="Picture 4" descr="One of These Groups Is Doin' It's Own Thing - Her Loyal Sons">
+            <a:extLst>
+              <a:ext uri="{FF2B5EF4-FFF2-40B4-BE49-F238E27FC236}">
+                <a16:creationId xmlns:a16="http://schemas.microsoft.com/office/drawing/2014/main" id="{48C2F6D1-5274-04AC-5120-EAEAB9C6A55E}"/>
+              </a:ext>
+            </a:extLst>
+          </p:cNvPr>
+          <p:cNvPicPr>
+            <a:picLocks noChangeAspect="1" noChangeArrowheads="1"/>
+          </p:cNvPicPr>
+          <p:nvPr/>
+        </p:nvPicPr>
+        <p:blipFill>
+          <a:blip r:embed="rId3">
+            <a:extLst>
+              <a:ext uri="{28A0092B-C50C-407E-A947-70E740481C1C}">
+                <a14:useLocalDpi xmlns:a14="http://schemas.microsoft.com/office/drawing/2010/main" val="0"/>
+              </a:ext>
+            </a:extLst>
+          </a:blip>
+          <a:srcRect/>
+          <a:stretch>
+            <a:fillRect/>
+          </a:stretch>
+        </p:blipFill>
+        <p:spPr bwMode="auto">
+          <a:xfrm>
+            <a:off x="918029" y="1346201"/>
+            <a:ext cx="4749800" cy="3799840"/>
+          </a:xfrm>
+          <a:prstGeom prst="rect">
+            <a:avLst/>
+          </a:prstGeom>
+          <a:noFill/>
+          <a:extLst>
+            <a:ext uri="{909E8E84-426E-40DD-AFC4-6F175D3DCCD1}">
+              <a14:hiddenFill xmlns:a14="http://schemas.microsoft.com/office/drawing/2010/main">
+                <a:solidFill>
+                  <a:srgbClr val="FFFFFF"/>
+                </a:solidFill>
+              </a14:hiddenFill>
+            </a:ext>
+          </a:extLst>
+        </p:spPr>
+      </p:pic>
     </p:spTree>
     <p:extLst>
       <p:ext uri="{BB962C8B-B14F-4D97-AF65-F5344CB8AC3E}">
@@ -3609,8 +3965,8 @@
         </p:nvSpPr>
         <p:spPr>
           <a:xfrm>
-            <a:off x="4495800" y="511629"/>
-            <a:ext cx="1724190" cy="369332"/>
+            <a:off x="3777342" y="446315"/>
+            <a:ext cx="2575513" cy="523220"/>
           </a:xfrm>
           <a:prstGeom prst="rect">
             <a:avLst/>
@@ -3624,7 +3980,7 @@
           <a:lstStyle/>
           <a:p>
             <a:r>
-              <a:rPr lang="en-US" dirty="0"/>
+              <a:rPr lang="en-US" sz="2800" dirty="0"/>
               <a:t>Simple Question</a:t>
             </a:r>
           </a:p>
@@ -3951,7 +4307,7 @@
         <p:spPr>
           <a:xfrm>
             <a:off x="304800" y="304800"/>
-            <a:ext cx="2835648" cy="369332"/>
+            <a:ext cx="3775072" cy="461665"/>
           </a:xfrm>
           <a:prstGeom prst="rect">
             <a:avLst/>
@@ -3965,7 +4321,7 @@
           <a:lstStyle/>
           <a:p>
             <a:r>
-              <a:rPr lang="en-US" dirty="0"/>
+              <a:rPr lang="en-US" sz="2400" b="1" dirty="0"/>
               <a:t>Some distance measures……</a:t>
             </a:r>
           </a:p>
@@ -4336,8 +4692,8 @@
         </p:nvSpPr>
         <p:spPr>
           <a:xfrm>
-            <a:off x="2057400" y="544286"/>
-            <a:ext cx="6196055" cy="369332"/>
+            <a:off x="1746567" y="214748"/>
+            <a:ext cx="8360815" cy="461665"/>
           </a:xfrm>
           <a:prstGeom prst="rect">
             <a:avLst/>
@@ -4351,9 +4707,305 @@
           <a:lstStyle/>
           <a:p>
             <a:r>
+              <a:rPr lang="en-US" sz="2400" b="1" dirty="0"/>
+              <a:t>Calculate all pairwise distances using the metric of your choice…</a:t>
+            </a:r>
+          </a:p>
+        </p:txBody>
+      </p:sp>
+      <p:pic>
+        <p:nvPicPr>
+          <p:cNvPr id="1030" name="Picture 6" descr="Pairwise distance matrices for all functions using data from the... |  Download Scientific Diagram">
+            <a:extLst>
+              <a:ext uri="{FF2B5EF4-FFF2-40B4-BE49-F238E27FC236}">
+                <a16:creationId xmlns:a16="http://schemas.microsoft.com/office/drawing/2014/main" id="{794896BE-7BE2-63AC-B7C2-03142722267A}"/>
+              </a:ext>
+            </a:extLst>
+          </p:cNvPr>
+          <p:cNvPicPr>
+            <a:picLocks noChangeAspect="1" noChangeArrowheads="1"/>
+          </p:cNvPicPr>
+          <p:nvPr/>
+        </p:nvPicPr>
+        <p:blipFill>
+          <a:blip r:embed="rId2">
+            <a:extLst>
+              <a:ext uri="{28A0092B-C50C-407E-A947-70E740481C1C}">
+                <a14:useLocalDpi xmlns:a14="http://schemas.microsoft.com/office/drawing/2010/main" val="0"/>
+              </a:ext>
+            </a:extLst>
+          </a:blip>
+          <a:srcRect/>
+          <a:stretch>
+            <a:fillRect/>
+          </a:stretch>
+        </p:blipFill>
+        <p:spPr bwMode="auto">
+          <a:xfrm>
+            <a:off x="287282" y="1516521"/>
+            <a:ext cx="3939552" cy="3793773"/>
+          </a:xfrm>
+          <a:prstGeom prst="rect">
+            <a:avLst/>
+          </a:prstGeom>
+          <a:noFill/>
+          <a:extLst>
+            <a:ext uri="{909E8E84-426E-40DD-AFC4-6F175D3DCCD1}">
+              <a14:hiddenFill xmlns:a14="http://schemas.microsoft.com/office/drawing/2010/main">
+                <a:solidFill>
+                  <a:srgbClr val="FFFFFF"/>
+                </a:solidFill>
+              </a14:hiddenFill>
+            </a:ext>
+          </a:extLst>
+        </p:spPr>
+      </p:pic>
+      <p:sp>
+        <p:nvSpPr>
+          <p:cNvPr id="3" name="TextBox 2">
+            <a:extLst>
+              <a:ext uri="{FF2B5EF4-FFF2-40B4-BE49-F238E27FC236}">
+                <a16:creationId xmlns:a16="http://schemas.microsoft.com/office/drawing/2014/main" id="{04C23480-B9C4-28D6-4E38-A91D8D24D8B5}"/>
+              </a:ext>
+            </a:extLst>
+          </p:cNvPr>
+          <p:cNvSpPr txBox="1"/>
+          <p:nvPr/>
+        </p:nvSpPr>
+        <p:spPr>
+          <a:xfrm>
+            <a:off x="4582886" y="1091978"/>
+            <a:ext cx="6096000" cy="646331"/>
+          </a:xfrm>
+          <a:prstGeom prst="rect">
+            <a:avLst/>
+          </a:prstGeom>
+          <a:noFill/>
+        </p:spPr>
+        <p:txBody>
+          <a:bodyPr wrap="square">
+            <a:spAutoFit/>
+          </a:bodyPr>
+          <a:lstStyle/>
+          <a:p>
+            <a:r>
+              <a:rPr lang="en-GB" b="0" i="0" dirty="0" err="1">
+                <a:solidFill>
+                  <a:srgbClr val="000000"/>
+                </a:solidFill>
+                <a:effectLst/>
+                <a:latin typeface="Verdana" panose="020B0604030504040204" pitchFamily="34" charset="0"/>
+              </a:rPr>
+              <a:t>Scipy</a:t>
+            </a:r>
+            <a:r>
+              <a:rPr lang="en-GB" b="0" i="0" dirty="0">
+                <a:solidFill>
+                  <a:srgbClr val="000000"/>
+                </a:solidFill>
+                <a:effectLst/>
+                <a:latin typeface="Verdana" panose="020B0604030504040204" pitchFamily="34" charset="0"/>
+              </a:rPr>
+              <a:t> has an integrated function "</a:t>
+            </a:r>
+            <a:r>
+              <a:rPr lang="en-GB" b="0" i="0" dirty="0" err="1">
+                <a:solidFill>
+                  <a:srgbClr val="000000"/>
+                </a:solidFill>
+                <a:effectLst/>
+                <a:latin typeface="Verdana" panose="020B0604030504040204" pitchFamily="34" charset="0"/>
+              </a:rPr>
+              <a:t>pdist</a:t>
+            </a:r>
+            <a:r>
+              <a:rPr lang="en-GB" b="0" i="0" dirty="0">
+                <a:solidFill>
+                  <a:srgbClr val="000000"/>
+                </a:solidFill>
+                <a:effectLst/>
+                <a:latin typeface="Verdana" panose="020B0604030504040204" pitchFamily="34" charset="0"/>
+              </a:rPr>
+              <a:t>" that can work with 22 different similarity measures</a:t>
+            </a:r>
+            <a:endParaRPr lang="en-US" dirty="0"/>
+          </a:p>
+        </p:txBody>
+      </p:sp>
+      <p:sp>
+        <p:nvSpPr>
+          <p:cNvPr id="5" name="TextBox 4">
+            <a:extLst>
+              <a:ext uri="{FF2B5EF4-FFF2-40B4-BE49-F238E27FC236}">
+                <a16:creationId xmlns:a16="http://schemas.microsoft.com/office/drawing/2014/main" id="{B5694F07-286F-F49C-F554-9D5BB396EDF4}"/>
+              </a:ext>
+            </a:extLst>
+          </p:cNvPr>
+          <p:cNvSpPr txBox="1"/>
+          <p:nvPr/>
+        </p:nvSpPr>
+        <p:spPr>
+          <a:xfrm>
+            <a:off x="6060168" y="2117812"/>
+            <a:ext cx="3766457" cy="3139321"/>
+          </a:xfrm>
+          <a:prstGeom prst="rect">
+            <a:avLst/>
+          </a:prstGeom>
+          <a:noFill/>
+        </p:spPr>
+        <p:txBody>
+          <a:bodyPr wrap="square" numCol="2" rtlCol="0">
+            <a:spAutoFit/>
+          </a:bodyPr>
+          <a:lstStyle/>
+          <a:p>
+            <a:r>
+              <a:rPr lang="en-US" dirty="0" err="1"/>
+              <a:t>euclidean</a:t>
+            </a:r>
+            <a:endParaRPr lang="en-US" dirty="0"/>
+          </a:p>
+          <a:p>
+            <a:r>
+              <a:rPr lang="en-US" dirty="0" err="1"/>
+              <a:t>minkowski</a:t>
+            </a:r>
+            <a:endParaRPr lang="en-US" dirty="0"/>
+          </a:p>
+          <a:p>
+            <a:r>
+              <a:rPr lang="en-US" dirty="0" err="1"/>
+              <a:t>cityblock</a:t>
+            </a:r>
+            <a:endParaRPr lang="en-US" dirty="0"/>
+          </a:p>
+          <a:p>
+            <a:r>
+              <a:rPr lang="en-US" dirty="0" err="1"/>
+              <a:t>seuclidean</a:t>
+            </a:r>
+            <a:endParaRPr lang="en-US" dirty="0"/>
+          </a:p>
+          <a:p>
+            <a:r>
+              <a:rPr lang="en-US" dirty="0" err="1"/>
+              <a:t>sqeuclidean</a:t>
+            </a:r>
+            <a:endParaRPr lang="en-US" dirty="0"/>
+          </a:p>
+          <a:p>
+            <a:r>
               <a:rPr lang="en-US" dirty="0"/>
-              <a:t>Calculate all pairwise distances using the metric of your choice…</a:t>
-            </a:r>
+              <a:t>cosine</a:t>
+            </a:r>
+          </a:p>
+          <a:p>
+            <a:r>
+              <a:rPr lang="en-US" dirty="0"/>
+              <a:t>correlation</a:t>
+            </a:r>
+          </a:p>
+          <a:p>
+            <a:r>
+              <a:rPr lang="en-US" dirty="0"/>
+              <a:t>hamming</a:t>
+            </a:r>
+          </a:p>
+          <a:p>
+            <a:r>
+              <a:rPr lang="en-US" dirty="0" err="1"/>
+              <a:t>jaccard</a:t>
+            </a:r>
+            <a:endParaRPr lang="en-US" dirty="0"/>
+          </a:p>
+          <a:p>
+            <a:r>
+              <a:rPr lang="en-US" dirty="0" err="1"/>
+              <a:t>chebyshev</a:t>
+            </a:r>
+            <a:endParaRPr lang="en-US" dirty="0"/>
+          </a:p>
+          <a:p>
+            <a:r>
+              <a:rPr lang="en-US" dirty="0" err="1"/>
+              <a:t>canberra</a:t>
+            </a:r>
+            <a:endParaRPr lang="en-US" dirty="0"/>
+          </a:p>
+          <a:p>
+            <a:r>
+              <a:rPr lang="en-US" dirty="0" err="1"/>
+              <a:t>braycurtis</a:t>
+            </a:r>
+            <a:endParaRPr lang="en-US" dirty="0"/>
+          </a:p>
+          <a:p>
+            <a:r>
+              <a:rPr lang="en-US" dirty="0" err="1"/>
+              <a:t>mahalanobis</a:t>
+            </a:r>
+            <a:endParaRPr lang="en-US" dirty="0"/>
+          </a:p>
+          <a:p>
+            <a:r>
+              <a:rPr lang="en-US" dirty="0"/>
+              <a:t>yule</a:t>
+            </a:r>
+          </a:p>
+          <a:p>
+            <a:r>
+              <a:rPr lang="en-US" dirty="0"/>
+              <a:t>matching</a:t>
+            </a:r>
+          </a:p>
+          <a:p>
+            <a:r>
+              <a:rPr lang="en-US" dirty="0"/>
+              <a:t>dice</a:t>
+            </a:r>
+          </a:p>
+          <a:p>
+            <a:r>
+              <a:rPr lang="en-US" dirty="0" err="1"/>
+              <a:t>kulsinski</a:t>
+            </a:r>
+            <a:endParaRPr lang="en-US" dirty="0"/>
+          </a:p>
+          <a:p>
+            <a:r>
+              <a:rPr lang="en-US" dirty="0" err="1"/>
+              <a:t>rogerstanimoto</a:t>
+            </a:r>
+            <a:endParaRPr lang="en-US" dirty="0"/>
+          </a:p>
+          <a:p>
+            <a:r>
+              <a:rPr lang="en-US" dirty="0" err="1"/>
+              <a:t>russellrao</a:t>
+            </a:r>
+            <a:endParaRPr lang="en-US" dirty="0"/>
+          </a:p>
+          <a:p>
+            <a:r>
+              <a:rPr lang="en-US" dirty="0" err="1"/>
+              <a:t>sokalmichener</a:t>
+            </a:r>
+            <a:endParaRPr lang="en-US" dirty="0"/>
+          </a:p>
+          <a:p>
+            <a:r>
+              <a:rPr lang="en-US" dirty="0" err="1"/>
+              <a:t>sokalsneath</a:t>
+            </a:r>
+            <a:endParaRPr lang="en-US" dirty="0"/>
+          </a:p>
+          <a:p>
+            <a:r>
+              <a:rPr lang="en-US" dirty="0" err="1"/>
+              <a:t>wminkowski</a:t>
+            </a:r>
+            <a:endParaRPr lang="en-US" dirty="0"/>
           </a:p>
         </p:txBody>
       </p:sp>
@@ -4387,12 +5039,354 @@
           <a:chExt cx="0" cy="0"/>
         </a:xfrm>
       </p:grpSpPr>
+      <p:sp>
+        <p:nvSpPr>
+          <p:cNvPr id="4" name="TextBox 3">
+            <a:extLst>
+              <a:ext uri="{FF2B5EF4-FFF2-40B4-BE49-F238E27FC236}">
+                <a16:creationId xmlns:a16="http://schemas.microsoft.com/office/drawing/2014/main" id="{457D7EF3-A65F-3271-E8E8-0CC3FEE2DC68}"/>
+              </a:ext>
+            </a:extLst>
+          </p:cNvPr>
+          <p:cNvSpPr txBox="1"/>
+          <p:nvPr/>
+        </p:nvSpPr>
+        <p:spPr>
+          <a:xfrm>
+            <a:off x="490711" y="213046"/>
+            <a:ext cx="5182831" cy="1631216"/>
+          </a:xfrm>
+          <a:prstGeom prst="rect">
+            <a:avLst/>
+          </a:prstGeom>
+          <a:noFill/>
+        </p:spPr>
+        <p:txBody>
+          <a:bodyPr wrap="square" rtlCol="0">
+            <a:spAutoFit/>
+          </a:bodyPr>
+          <a:lstStyle/>
+          <a:p>
+            <a:r>
+              <a:rPr lang="en-US" sz="2000" b="1" dirty="0"/>
+              <a:t>Use the grid of pairwise values to cluster.</a:t>
+            </a:r>
+          </a:p>
+          <a:p>
+            <a:endParaRPr lang="en-US" sz="2000" b="1" dirty="0"/>
+          </a:p>
+          <a:p>
+            <a:endParaRPr lang="en-US" sz="2000" b="1" dirty="0"/>
+          </a:p>
+          <a:p>
+            <a:endParaRPr lang="en-US" sz="2000" b="1" dirty="0"/>
+          </a:p>
+          <a:p>
+            <a:endParaRPr lang="en-US" sz="2000" b="1" dirty="0"/>
+          </a:p>
+        </p:txBody>
+      </p:sp>
+      <p:sp>
+        <p:nvSpPr>
+          <p:cNvPr id="5" name="TextBox 4">
+            <a:extLst>
+              <a:ext uri="{FF2B5EF4-FFF2-40B4-BE49-F238E27FC236}">
+                <a16:creationId xmlns:a16="http://schemas.microsoft.com/office/drawing/2014/main" id="{815F0A58-3DE8-DC8F-427C-F3E5952A26D6}"/>
+              </a:ext>
+            </a:extLst>
+          </p:cNvPr>
+          <p:cNvSpPr txBox="1"/>
+          <p:nvPr/>
+        </p:nvSpPr>
+        <p:spPr>
+          <a:xfrm>
+            <a:off x="0" y="700598"/>
+            <a:ext cx="4807983" cy="830997"/>
+          </a:xfrm>
+          <a:prstGeom prst="rect">
+            <a:avLst/>
+          </a:prstGeom>
+          <a:noFill/>
+        </p:spPr>
+        <p:txBody>
+          <a:bodyPr wrap="none" rtlCol="0">
+            <a:spAutoFit/>
+          </a:bodyPr>
+          <a:lstStyle/>
+          <a:p>
+            <a:r>
+              <a:rPr lang="en-US" sz="1600" b="1" dirty="0"/>
+              <a:t>Centroid-based</a:t>
+            </a:r>
+            <a:br>
+              <a:rPr lang="en-US" sz="1600" dirty="0"/>
+            </a:br>
+            <a:r>
+              <a:rPr lang="en-US" sz="1600" dirty="0"/>
+              <a:t>k-means</a:t>
+            </a:r>
+          </a:p>
+          <a:p>
+            <a:r>
+              <a:rPr lang="en-US" sz="1600" dirty="0"/>
+              <a:t>mini-Batch k-means (sample rather than whole dataset)</a:t>
+            </a:r>
+          </a:p>
+        </p:txBody>
+      </p:sp>
+      <p:sp>
+        <p:nvSpPr>
+          <p:cNvPr id="6" name="TextBox 5">
+            <a:extLst>
+              <a:ext uri="{FF2B5EF4-FFF2-40B4-BE49-F238E27FC236}">
+                <a16:creationId xmlns:a16="http://schemas.microsoft.com/office/drawing/2014/main" id="{07276EBD-2A90-45A3-7094-A500FA51230B}"/>
+              </a:ext>
+            </a:extLst>
+          </p:cNvPr>
+          <p:cNvSpPr txBox="1"/>
+          <p:nvPr/>
+        </p:nvSpPr>
+        <p:spPr>
+          <a:xfrm>
+            <a:off x="0" y="1751929"/>
+            <a:ext cx="5326907" cy="2062103"/>
+          </a:xfrm>
+          <a:prstGeom prst="rect">
+            <a:avLst/>
+          </a:prstGeom>
+          <a:noFill/>
+        </p:spPr>
+        <p:txBody>
+          <a:bodyPr wrap="none" rtlCol="0">
+            <a:spAutoFit/>
+          </a:bodyPr>
+          <a:lstStyle/>
+          <a:p>
+            <a:r>
+              <a:rPr lang="en-US" sz="1600" b="1" dirty="0"/>
+              <a:t>Hierarchy-based</a:t>
+            </a:r>
+          </a:p>
+          <a:p>
+            <a:r>
+              <a:rPr lang="en-US" sz="1600" dirty="0"/>
+              <a:t>Agglomerative (bottom up - grouping)</a:t>
+            </a:r>
+          </a:p>
+          <a:p>
+            <a:r>
+              <a:rPr lang="en-US" sz="1600" dirty="0"/>
+              <a:t>Divisive (top down - </a:t>
+            </a:r>
+            <a:r>
+              <a:rPr lang="en-US" sz="1600" dirty="0" err="1"/>
+              <a:t>spliting</a:t>
+            </a:r>
+            <a:r>
+              <a:rPr lang="en-US" sz="1600" dirty="0"/>
+              <a:t>)</a:t>
+            </a:r>
+          </a:p>
+          <a:p>
+            <a:endParaRPr lang="en-US" sz="1600" dirty="0"/>
+          </a:p>
+          <a:p>
+            <a:r>
+              <a:rPr lang="en-US" sz="1600" dirty="0"/>
+              <a:t>BIRCH (</a:t>
+            </a:r>
+            <a:r>
+              <a:rPr lang="en-GB" sz="1600" b="0" i="0" dirty="0">
+                <a:solidFill>
+                  <a:srgbClr val="555555"/>
+                </a:solidFill>
+                <a:effectLst/>
+                <a:latin typeface="Helvetica Neue" panose="02000503000000020004" pitchFamily="2" charset="0"/>
+              </a:rPr>
+              <a:t>Balanced Iterative Reducing and Clustering using</a:t>
+            </a:r>
+            <a:br>
+              <a:rPr lang="en-GB" sz="1600" dirty="0"/>
+            </a:br>
+            <a:r>
+              <a:rPr lang="en-GB" sz="1600" b="0" i="0" dirty="0">
+                <a:solidFill>
+                  <a:srgbClr val="555555"/>
+                </a:solidFill>
+                <a:effectLst/>
+                <a:latin typeface="Helvetica Neue" panose="02000503000000020004" pitchFamily="2" charset="0"/>
+              </a:rPr>
+              <a:t>Hierarchies)</a:t>
+            </a:r>
+          </a:p>
+          <a:p>
+            <a:r>
+              <a:rPr lang="en-GB" sz="1600" dirty="0">
+                <a:solidFill>
+                  <a:srgbClr val="555555"/>
+                </a:solidFill>
+                <a:latin typeface="Helvetica Neue" panose="02000503000000020004" pitchFamily="2" charset="0"/>
+              </a:rPr>
+              <a:t>UPGMA</a:t>
+            </a:r>
+            <a:endParaRPr lang="en-US" sz="1600" dirty="0"/>
+          </a:p>
+          <a:p>
+            <a:endParaRPr lang="en-US" sz="1600" dirty="0"/>
+          </a:p>
+        </p:txBody>
+      </p:sp>
+      <p:sp>
+        <p:nvSpPr>
+          <p:cNvPr id="7" name="TextBox 6">
+            <a:extLst>
+              <a:ext uri="{FF2B5EF4-FFF2-40B4-BE49-F238E27FC236}">
+                <a16:creationId xmlns:a16="http://schemas.microsoft.com/office/drawing/2014/main" id="{F177C822-CAC3-B39E-37DB-F9B9B0C1C797}"/>
+              </a:ext>
+            </a:extLst>
+          </p:cNvPr>
+          <p:cNvSpPr txBox="1"/>
+          <p:nvPr/>
+        </p:nvSpPr>
+        <p:spPr>
+          <a:xfrm>
+            <a:off x="0" y="4677053"/>
+            <a:ext cx="5934510" cy="2062103"/>
+          </a:xfrm>
+          <a:prstGeom prst="rect">
+            <a:avLst/>
+          </a:prstGeom>
+          <a:noFill/>
+        </p:spPr>
+        <p:txBody>
+          <a:bodyPr wrap="none" rtlCol="0">
+            <a:spAutoFit/>
+          </a:bodyPr>
+          <a:lstStyle/>
+          <a:p>
+            <a:r>
+              <a:rPr lang="en-US" sz="1600" b="1" dirty="0"/>
+              <a:t>Density-based</a:t>
+            </a:r>
+          </a:p>
+          <a:p>
+            <a:r>
+              <a:rPr lang="en-US" sz="1600" dirty="0"/>
+              <a:t>Use </a:t>
+            </a:r>
+            <a:r>
+              <a:rPr lang="en-GB" sz="1600" b="0" i="0" dirty="0">
+                <a:solidFill>
+                  <a:srgbClr val="202122"/>
+                </a:solidFill>
+                <a:effectLst/>
+              </a:rPr>
+              <a:t>density drop to detect cluster borders</a:t>
+            </a:r>
+          </a:p>
+          <a:p>
+            <a:endParaRPr lang="en-US" sz="1600" dirty="0"/>
+          </a:p>
+          <a:p>
+            <a:r>
+              <a:rPr lang="en-US" sz="1600" dirty="0"/>
+              <a:t>DBSCAN (</a:t>
+            </a:r>
+            <a:r>
+              <a:rPr lang="en-GB" sz="1600" b="0" i="0" dirty="0">
+                <a:solidFill>
+                  <a:srgbClr val="555555"/>
+                </a:solidFill>
+                <a:effectLst/>
+              </a:rPr>
+              <a:t>Density-Based Spatial Clustering of Applications with Noise)</a:t>
+            </a:r>
+            <a:endParaRPr lang="en-US" sz="1600" dirty="0"/>
+          </a:p>
+          <a:p>
+            <a:r>
+              <a:rPr lang="en-US" sz="1600" dirty="0"/>
+              <a:t>OPTICS</a:t>
+            </a:r>
+          </a:p>
+          <a:p>
+            <a:r>
+              <a:rPr lang="en-US" sz="1600" dirty="0" err="1"/>
+              <a:t>MiMean</a:t>
+            </a:r>
+            <a:r>
+              <a:rPr lang="en-US" sz="1600" dirty="0"/>
+              <a:t> Shift</a:t>
+            </a:r>
+          </a:p>
+          <a:p>
+            <a:endParaRPr lang="en-US" sz="1600" dirty="0"/>
+          </a:p>
+          <a:p>
+            <a:endParaRPr lang="en-US" sz="1600" dirty="0"/>
+          </a:p>
+        </p:txBody>
+      </p:sp>
+      <p:sp>
+        <p:nvSpPr>
+          <p:cNvPr id="8" name="TextBox 7">
+            <a:extLst>
+              <a:ext uri="{FF2B5EF4-FFF2-40B4-BE49-F238E27FC236}">
+                <a16:creationId xmlns:a16="http://schemas.microsoft.com/office/drawing/2014/main" id="{9A18DB13-3327-720B-EFD0-B06B8A874E47}"/>
+              </a:ext>
+            </a:extLst>
+          </p:cNvPr>
+          <p:cNvSpPr txBox="1"/>
+          <p:nvPr/>
+        </p:nvSpPr>
+        <p:spPr>
+          <a:xfrm>
+            <a:off x="0" y="3567811"/>
+            <a:ext cx="1769331" cy="1077218"/>
+          </a:xfrm>
+          <a:prstGeom prst="rect">
+            <a:avLst/>
+          </a:prstGeom>
+          <a:noFill/>
+        </p:spPr>
+        <p:txBody>
+          <a:bodyPr wrap="none" rtlCol="0">
+            <a:spAutoFit/>
+          </a:bodyPr>
+          <a:lstStyle/>
+          <a:p>
+            <a:r>
+              <a:rPr lang="en-US" sz="1600" b="1" dirty="0"/>
+              <a:t>Distribution-based</a:t>
+            </a:r>
+            <a:br>
+              <a:rPr lang="en-US" sz="1600" dirty="0"/>
+            </a:br>
+            <a:r>
+              <a:rPr lang="en-US" sz="1600" dirty="0"/>
+              <a:t>GMM – Gaussian</a:t>
+            </a:r>
+          </a:p>
+          <a:p>
+            <a:r>
+              <a:rPr lang="en-US" sz="1600" dirty="0"/>
+              <a:t>DMM</a:t>
+            </a:r>
+          </a:p>
+          <a:p>
+            <a:r>
+              <a:rPr lang="en-US" sz="1600" dirty="0"/>
+              <a:t>EM</a:t>
+            </a:r>
+          </a:p>
+        </p:txBody>
+      </p:sp>
       <p:pic>
         <p:nvPicPr>
-          <p:cNvPr id="3074" name="Picture 2">
-            <a:extLst>
-              <a:ext uri="{FF2B5EF4-FFF2-40B4-BE49-F238E27FC236}">
-                <a16:creationId xmlns:a16="http://schemas.microsoft.com/office/drawing/2014/main" id="{FFC450CF-B77E-7308-49C1-2A089033089D}"/>
+          <p:cNvPr id="2050" name="Picture 2">
+            <a:extLst>
+              <a:ext uri="{FF2B5EF4-FFF2-40B4-BE49-F238E27FC236}">
+                <a16:creationId xmlns:a16="http://schemas.microsoft.com/office/drawing/2014/main" id="{262DC1C3-A68C-4E4A-AF04-EF7E8F3243D5}"/>
               </a:ext>
             </a:extLst>
           </p:cNvPr>
@@ -4416,8 +5410,8 @@
         </p:blipFill>
         <p:spPr bwMode="auto">
           <a:xfrm>
-            <a:off x="427194" y="1411584"/>
-            <a:ext cx="5308600" cy="4229100"/>
+            <a:off x="5742359" y="0"/>
+            <a:ext cx="6478587" cy="6858000"/>
           </a:xfrm>
           <a:prstGeom prst="rect">
             <a:avLst/>
@@ -4434,233 +5428,10 @@
           </a:extLst>
         </p:spPr>
       </p:pic>
-      <p:sp>
-        <p:nvSpPr>
-          <p:cNvPr id="4" name="TextBox 3">
-            <a:extLst>
-              <a:ext uri="{FF2B5EF4-FFF2-40B4-BE49-F238E27FC236}">
-                <a16:creationId xmlns:a16="http://schemas.microsoft.com/office/drawing/2014/main" id="{59A10184-FD22-8B52-18E1-BE37261D8BC6}"/>
-              </a:ext>
-            </a:extLst>
-          </p:cNvPr>
-          <p:cNvSpPr txBox="1"/>
-          <p:nvPr/>
-        </p:nvSpPr>
-        <p:spPr>
-          <a:xfrm>
-            <a:off x="6096000" y="919215"/>
-            <a:ext cx="5823133" cy="5447645"/>
-          </a:xfrm>
-          <a:prstGeom prst="rect">
-            <a:avLst/>
-          </a:prstGeom>
-          <a:noFill/>
-        </p:spPr>
-        <p:txBody>
-          <a:bodyPr wrap="none" rtlCol="0">
-            <a:spAutoFit/>
-          </a:bodyPr>
-          <a:lstStyle/>
-          <a:p>
-            <a:r>
-              <a:rPr lang="en-US" sz="2400" b="1" dirty="0"/>
-              <a:t>Finding the ‘tree’ of relationships</a:t>
-            </a:r>
-          </a:p>
-          <a:p>
-            <a:endParaRPr lang="en-US" dirty="0"/>
-          </a:p>
-          <a:p>
-            <a:r>
-              <a:rPr lang="en-US" dirty="0"/>
-              <a:t>Different methods possible here too.</a:t>
-            </a:r>
-          </a:p>
-          <a:p>
-            <a:endParaRPr lang="en-US" dirty="0"/>
-          </a:p>
-          <a:p>
-            <a:r>
-              <a:rPr lang="en-US" i="1" dirty="0"/>
-              <a:t>Joining together</a:t>
-            </a:r>
-          </a:p>
-          <a:p>
-            <a:r>
-              <a:rPr lang="en-US" dirty="0"/>
-              <a:t>Usually start with two closest. How to add in third?</a:t>
-            </a:r>
-          </a:p>
-          <a:p>
-            <a:r>
-              <a:rPr lang="en-US" dirty="0"/>
-              <a:t>Could add the next closest to that pair, </a:t>
-            </a:r>
-          </a:p>
-          <a:p>
-            <a:r>
-              <a:rPr lang="en-US" dirty="0"/>
-              <a:t>or pair up the 3</a:t>
-            </a:r>
-            <a:r>
-              <a:rPr lang="en-US" baseline="30000" dirty="0"/>
-              <a:t>rd</a:t>
-            </a:r>
-            <a:r>
-              <a:rPr lang="en-US" dirty="0"/>
-              <a:t> and fourth closest?</a:t>
-            </a:r>
-          </a:p>
-          <a:p>
-            <a:r>
-              <a:rPr lang="en-US" dirty="0"/>
-              <a:t>Keep going </a:t>
-            </a:r>
-            <a:r>
-              <a:rPr lang="en-US" dirty="0" err="1"/>
-              <a:t>til</a:t>
-            </a:r>
-            <a:r>
-              <a:rPr lang="en-US" dirty="0"/>
-              <a:t> you have k groups</a:t>
-            </a:r>
-          </a:p>
-          <a:p>
-            <a:endParaRPr lang="en-US" dirty="0"/>
-          </a:p>
-          <a:p>
-            <a:r>
-              <a:rPr lang="en-US" i="1" dirty="0"/>
-              <a:t>How do you join groups?  </a:t>
-            </a:r>
-          </a:p>
-          <a:p>
-            <a:r>
-              <a:rPr lang="en-US" dirty="0"/>
-              <a:t>Re-calculate distances from center?</a:t>
-            </a:r>
-          </a:p>
-          <a:p>
-            <a:r>
-              <a:rPr lang="en-US" dirty="0"/>
-              <a:t>Re-calculate distances from nearest edge?</a:t>
-            </a:r>
-          </a:p>
-          <a:p>
-            <a:r>
-              <a:rPr lang="en-US" dirty="0"/>
-              <a:t>Re-calculate distances from furthest edge?</a:t>
-            </a:r>
-          </a:p>
-          <a:p>
-            <a:endParaRPr lang="en-US" dirty="0"/>
-          </a:p>
-          <a:p>
-            <a:r>
-              <a:rPr lang="en-US" i="1" dirty="0"/>
-              <a:t>Dividing</a:t>
-            </a:r>
-          </a:p>
-          <a:p>
-            <a:r>
-              <a:rPr lang="en-US" dirty="0"/>
-              <a:t>Which are the outlier points?</a:t>
-            </a:r>
-          </a:p>
-          <a:p>
-            <a:r>
-              <a:rPr lang="en-US" dirty="0"/>
-              <a:t>Keep splitting the the least similar cluster until you’ve </a:t>
-            </a:r>
-          </a:p>
-          <a:p>
-            <a:r>
-              <a:rPr lang="en-US" dirty="0"/>
-              <a:t>divided up the set into as many groups as you like (k groups)</a:t>
-            </a:r>
-          </a:p>
-        </p:txBody>
-      </p:sp>
-      <p:sp>
-        <p:nvSpPr>
-          <p:cNvPr id="5" name="TextBox 4">
-            <a:extLst>
-              <a:ext uri="{FF2B5EF4-FFF2-40B4-BE49-F238E27FC236}">
-                <a16:creationId xmlns:a16="http://schemas.microsoft.com/office/drawing/2014/main" id="{645BE736-94C9-1A23-ACB3-B3D171FF3399}"/>
-              </a:ext>
-            </a:extLst>
-          </p:cNvPr>
-          <p:cNvSpPr txBox="1"/>
-          <p:nvPr/>
-        </p:nvSpPr>
-        <p:spPr>
-          <a:xfrm>
-            <a:off x="2616708" y="234462"/>
-            <a:ext cx="6512424" cy="584775"/>
-          </a:xfrm>
-          <a:prstGeom prst="rect">
-            <a:avLst/>
-          </a:prstGeom>
-          <a:noFill/>
-        </p:spPr>
-        <p:txBody>
-          <a:bodyPr wrap="none" rtlCol="0">
-            <a:spAutoFit/>
-          </a:bodyPr>
-          <a:lstStyle/>
-          <a:p>
-            <a:r>
-              <a:rPr lang="en-US" sz="3200" b="1" dirty="0"/>
-              <a:t>Hierarchical clustering - dendrograms</a:t>
-            </a:r>
-          </a:p>
-        </p:txBody>
-      </p:sp>
-      <p:sp>
-        <p:nvSpPr>
-          <p:cNvPr id="6" name="TextBox 5">
-            <a:extLst>
-              <a:ext uri="{FF2B5EF4-FFF2-40B4-BE49-F238E27FC236}">
-                <a16:creationId xmlns:a16="http://schemas.microsoft.com/office/drawing/2014/main" id="{A63E16E7-D1CB-AAF5-BEFE-AEBE28ECDF0C}"/>
-              </a:ext>
-            </a:extLst>
-          </p:cNvPr>
-          <p:cNvSpPr txBox="1"/>
-          <p:nvPr/>
-        </p:nvSpPr>
-        <p:spPr>
-          <a:xfrm>
-            <a:off x="544425" y="5977207"/>
-            <a:ext cx="2717988" cy="646331"/>
-          </a:xfrm>
-          <a:prstGeom prst="rect">
-            <a:avLst/>
-          </a:prstGeom>
-          <a:noFill/>
-        </p:spPr>
-        <p:txBody>
-          <a:bodyPr wrap="none" rtlCol="0">
-            <a:spAutoFit/>
-          </a:bodyPr>
-          <a:lstStyle/>
-          <a:p>
-            <a:r>
-              <a:rPr lang="en-US" dirty="0"/>
-              <a:t>Computationally expensive</a:t>
-            </a:r>
-          </a:p>
-          <a:p>
-            <a:r>
-              <a:rPr lang="en-US" dirty="0"/>
-              <a:t>Sensitive to outliers</a:t>
-            </a:r>
-          </a:p>
-        </p:txBody>
-      </p:sp>
     </p:spTree>
     <p:extLst>
       <p:ext uri="{BB962C8B-B14F-4D97-AF65-F5344CB8AC3E}">
-        <p14:creationId xmlns:p14="http://schemas.microsoft.com/office/powerpoint/2010/main" val="2464388185"/>
+        <p14:creationId xmlns:p14="http://schemas.microsoft.com/office/powerpoint/2010/main" val="1641295863"/>
       </p:ext>
     </p:extLst>
   </p:cSld>
@@ -4689,6 +5460,306 @@
       </p:grpSpPr>
       <p:pic>
         <p:nvPicPr>
+          <p:cNvPr id="3074" name="Picture 2">
+            <a:extLst>
+              <a:ext uri="{FF2B5EF4-FFF2-40B4-BE49-F238E27FC236}">
+                <a16:creationId xmlns:a16="http://schemas.microsoft.com/office/drawing/2014/main" id="{FFC450CF-B77E-7308-49C1-2A089033089D}"/>
+              </a:ext>
+            </a:extLst>
+          </p:cNvPr>
+          <p:cNvPicPr>
+            <a:picLocks noChangeAspect="1" noChangeArrowheads="1"/>
+          </p:cNvPicPr>
+          <p:nvPr/>
+        </p:nvPicPr>
+        <p:blipFill>
+          <a:blip r:embed="rId2">
+            <a:extLst>
+              <a:ext uri="{28A0092B-C50C-407E-A947-70E740481C1C}">
+                <a14:useLocalDpi xmlns:a14="http://schemas.microsoft.com/office/drawing/2010/main" val="0"/>
+              </a:ext>
+            </a:extLst>
+          </a:blip>
+          <a:srcRect/>
+          <a:stretch>
+            <a:fillRect/>
+          </a:stretch>
+        </p:blipFill>
+        <p:spPr bwMode="auto">
+          <a:xfrm>
+            <a:off x="427194" y="1411584"/>
+            <a:ext cx="5308600" cy="4229100"/>
+          </a:xfrm>
+          <a:prstGeom prst="rect">
+            <a:avLst/>
+          </a:prstGeom>
+          <a:noFill/>
+          <a:extLst>
+            <a:ext uri="{909E8E84-426E-40DD-AFC4-6F175D3DCCD1}">
+              <a14:hiddenFill xmlns:a14="http://schemas.microsoft.com/office/drawing/2010/main">
+                <a:solidFill>
+                  <a:srgbClr val="FFFFFF"/>
+                </a:solidFill>
+              </a14:hiddenFill>
+            </a:ext>
+          </a:extLst>
+        </p:spPr>
+      </p:pic>
+      <p:sp>
+        <p:nvSpPr>
+          <p:cNvPr id="4" name="TextBox 3">
+            <a:extLst>
+              <a:ext uri="{FF2B5EF4-FFF2-40B4-BE49-F238E27FC236}">
+                <a16:creationId xmlns:a16="http://schemas.microsoft.com/office/drawing/2014/main" id="{59A10184-FD22-8B52-18E1-BE37261D8BC6}"/>
+              </a:ext>
+            </a:extLst>
+          </p:cNvPr>
+          <p:cNvSpPr txBox="1"/>
+          <p:nvPr/>
+        </p:nvSpPr>
+        <p:spPr>
+          <a:xfrm>
+            <a:off x="6096000" y="919215"/>
+            <a:ext cx="5823133" cy="5447645"/>
+          </a:xfrm>
+          <a:prstGeom prst="rect">
+            <a:avLst/>
+          </a:prstGeom>
+          <a:noFill/>
+        </p:spPr>
+        <p:txBody>
+          <a:bodyPr wrap="none" rtlCol="0">
+            <a:spAutoFit/>
+          </a:bodyPr>
+          <a:lstStyle/>
+          <a:p>
+            <a:r>
+              <a:rPr lang="en-US" sz="2400" b="1" dirty="0"/>
+              <a:t>Finding the ‘tree’ of relationships</a:t>
+            </a:r>
+          </a:p>
+          <a:p>
+            <a:endParaRPr lang="en-US" dirty="0"/>
+          </a:p>
+          <a:p>
+            <a:r>
+              <a:rPr lang="en-US" dirty="0"/>
+              <a:t>Different methods possible here too.</a:t>
+            </a:r>
+          </a:p>
+          <a:p>
+            <a:endParaRPr lang="en-US" dirty="0"/>
+          </a:p>
+          <a:p>
+            <a:r>
+              <a:rPr lang="en-US" i="1" dirty="0"/>
+              <a:t>Joining together</a:t>
+            </a:r>
+          </a:p>
+          <a:p>
+            <a:r>
+              <a:rPr lang="en-US" dirty="0"/>
+              <a:t>Usually start with two closest. How to add in third?</a:t>
+            </a:r>
+          </a:p>
+          <a:p>
+            <a:r>
+              <a:rPr lang="en-US" dirty="0"/>
+              <a:t>Could add the next closest to that pair, </a:t>
+            </a:r>
+          </a:p>
+          <a:p>
+            <a:r>
+              <a:rPr lang="en-US" dirty="0"/>
+              <a:t>or pair up the 3</a:t>
+            </a:r>
+            <a:r>
+              <a:rPr lang="en-US" baseline="30000" dirty="0"/>
+              <a:t>rd</a:t>
+            </a:r>
+            <a:r>
+              <a:rPr lang="en-US" dirty="0"/>
+              <a:t> and fourth closest?</a:t>
+            </a:r>
+          </a:p>
+          <a:p>
+            <a:r>
+              <a:rPr lang="en-US" dirty="0"/>
+              <a:t>Keep going </a:t>
+            </a:r>
+            <a:r>
+              <a:rPr lang="en-US" dirty="0" err="1"/>
+              <a:t>til</a:t>
+            </a:r>
+            <a:r>
+              <a:rPr lang="en-US" dirty="0"/>
+              <a:t> you have k groups</a:t>
+            </a:r>
+          </a:p>
+          <a:p>
+            <a:endParaRPr lang="en-US" dirty="0"/>
+          </a:p>
+          <a:p>
+            <a:r>
+              <a:rPr lang="en-US" i="1" dirty="0"/>
+              <a:t>How do you join groups?  </a:t>
+            </a:r>
+          </a:p>
+          <a:p>
+            <a:r>
+              <a:rPr lang="en-US" dirty="0"/>
+              <a:t>Re-calculate distances from center?</a:t>
+            </a:r>
+          </a:p>
+          <a:p>
+            <a:r>
+              <a:rPr lang="en-US" dirty="0"/>
+              <a:t>Re-calculate distances from nearest edge?</a:t>
+            </a:r>
+          </a:p>
+          <a:p>
+            <a:r>
+              <a:rPr lang="en-US" dirty="0"/>
+              <a:t>Re-calculate distances from furthest edge?</a:t>
+            </a:r>
+          </a:p>
+          <a:p>
+            <a:endParaRPr lang="en-US" dirty="0"/>
+          </a:p>
+          <a:p>
+            <a:r>
+              <a:rPr lang="en-US" i="1" dirty="0"/>
+              <a:t>Dividing</a:t>
+            </a:r>
+          </a:p>
+          <a:p>
+            <a:r>
+              <a:rPr lang="en-US" dirty="0"/>
+              <a:t>Which are the outlier points?</a:t>
+            </a:r>
+          </a:p>
+          <a:p>
+            <a:r>
+              <a:rPr lang="en-US" dirty="0"/>
+              <a:t>Keep splitting the the least similar cluster until you’ve </a:t>
+            </a:r>
+          </a:p>
+          <a:p>
+            <a:r>
+              <a:rPr lang="en-US" dirty="0"/>
+              <a:t>divided up the set into as many groups as you like (k groups)</a:t>
+            </a:r>
+          </a:p>
+        </p:txBody>
+      </p:sp>
+      <p:sp>
+        <p:nvSpPr>
+          <p:cNvPr id="5" name="TextBox 4">
+            <a:extLst>
+              <a:ext uri="{FF2B5EF4-FFF2-40B4-BE49-F238E27FC236}">
+                <a16:creationId xmlns:a16="http://schemas.microsoft.com/office/drawing/2014/main" id="{645BE736-94C9-1A23-ACB3-B3D171FF3399}"/>
+              </a:ext>
+            </a:extLst>
+          </p:cNvPr>
+          <p:cNvSpPr txBox="1"/>
+          <p:nvPr/>
+        </p:nvSpPr>
+        <p:spPr>
+          <a:xfrm>
+            <a:off x="2616708" y="234462"/>
+            <a:ext cx="6512424" cy="584775"/>
+          </a:xfrm>
+          <a:prstGeom prst="rect">
+            <a:avLst/>
+          </a:prstGeom>
+          <a:noFill/>
+        </p:spPr>
+        <p:txBody>
+          <a:bodyPr wrap="none" rtlCol="0">
+            <a:spAutoFit/>
+          </a:bodyPr>
+          <a:lstStyle/>
+          <a:p>
+            <a:r>
+              <a:rPr lang="en-US" sz="3200" b="1" dirty="0"/>
+              <a:t>Hierarchical clustering - dendrograms</a:t>
+            </a:r>
+          </a:p>
+        </p:txBody>
+      </p:sp>
+      <p:sp>
+        <p:nvSpPr>
+          <p:cNvPr id="6" name="TextBox 5">
+            <a:extLst>
+              <a:ext uri="{FF2B5EF4-FFF2-40B4-BE49-F238E27FC236}">
+                <a16:creationId xmlns:a16="http://schemas.microsoft.com/office/drawing/2014/main" id="{A63E16E7-D1CB-AAF5-BEFE-AEBE28ECDF0C}"/>
+              </a:ext>
+            </a:extLst>
+          </p:cNvPr>
+          <p:cNvSpPr txBox="1"/>
+          <p:nvPr/>
+        </p:nvSpPr>
+        <p:spPr>
+          <a:xfrm>
+            <a:off x="544425" y="5977207"/>
+            <a:ext cx="2717988" cy="646331"/>
+          </a:xfrm>
+          <a:prstGeom prst="rect">
+            <a:avLst/>
+          </a:prstGeom>
+          <a:noFill/>
+        </p:spPr>
+        <p:txBody>
+          <a:bodyPr wrap="none" rtlCol="0">
+            <a:spAutoFit/>
+          </a:bodyPr>
+          <a:lstStyle/>
+          <a:p>
+            <a:r>
+              <a:rPr lang="en-US" dirty="0"/>
+              <a:t>Computationally expensive</a:t>
+            </a:r>
+          </a:p>
+          <a:p>
+            <a:r>
+              <a:rPr lang="en-US" dirty="0"/>
+              <a:t>Sensitive to outliers</a:t>
+            </a:r>
+          </a:p>
+        </p:txBody>
+      </p:sp>
+    </p:spTree>
+    <p:extLst>
+      <p:ext uri="{BB962C8B-B14F-4D97-AF65-F5344CB8AC3E}">
+        <p14:creationId xmlns:p14="http://schemas.microsoft.com/office/powerpoint/2010/main" val="2464388185"/>
+      </p:ext>
+    </p:extLst>
+  </p:cSld>
+  <p:clrMapOvr>
+    <a:masterClrMapping/>
+  </p:clrMapOvr>
+</p:sld>
+</file>
+
+<file path=ppt/slides/slide7.xml><?xml version="1.0" encoding="utf-8"?>
+<p:sld xmlns:a="http://schemas.openxmlformats.org/drawingml/2006/main" xmlns:r="http://schemas.openxmlformats.org/officeDocument/2006/relationships" xmlns:p="http://schemas.openxmlformats.org/presentationml/2006/main">
+  <p:cSld>
+    <p:spTree>
+      <p:nvGrpSpPr>
+        <p:cNvPr id="1" name=""/>
+        <p:cNvGrpSpPr/>
+        <p:nvPr/>
+      </p:nvGrpSpPr>
+      <p:grpSpPr>
+        <a:xfrm>
+          <a:off x="0" y="0"/>
+          <a:ext cx="0" cy="0"/>
+          <a:chOff x="0" y="0"/>
+          <a:chExt cx="0" cy="0"/>
+        </a:xfrm>
+      </p:grpSpPr>
+      <p:pic>
+        <p:nvPicPr>
           <p:cNvPr id="4098" name="Picture 2">
             <a:extLst>
               <a:ext uri="{FF2B5EF4-FFF2-40B4-BE49-F238E27FC236}">
@@ -4748,8 +5819,8 @@
         </p:nvSpPr>
         <p:spPr>
           <a:xfrm>
-            <a:off x="3818238" y="493674"/>
-            <a:ext cx="2611164" cy="461665"/>
+            <a:off x="2359551" y="215969"/>
+            <a:ext cx="5052986" cy="584775"/>
           </a:xfrm>
           <a:prstGeom prst="rect">
             <a:avLst/>
@@ -4763,9 +5834,14 @@
           <a:lstStyle/>
           <a:p>
             <a:r>
-              <a:rPr lang="en-US" sz="2400" b="1" dirty="0"/>
-              <a:t>Partition clustering</a:t>
-            </a:r>
+              <a:rPr lang="en-US" sz="3200" b="1" dirty="0"/>
+              <a:t>Partition clustering - </a:t>
+            </a:r>
+            <a:r>
+              <a:rPr lang="en-US" sz="3200" b="1" dirty="0" err="1"/>
+              <a:t>kmeans</a:t>
+            </a:r>
+            <a:endParaRPr lang="en-US" sz="3200" b="1" dirty="0"/>
           </a:p>
         </p:txBody>
       </p:sp>
@@ -4783,7 +5859,7 @@
         </p:nvSpPr>
         <p:spPr>
           <a:xfrm>
-            <a:off x="6096000" y="1859339"/>
+            <a:off x="6096000" y="1230923"/>
             <a:ext cx="5298830" cy="4524315"/>
           </a:xfrm>
           <a:prstGeom prst="rect">
@@ -4943,6 +6019,41 @@
               <a:t>um of the Squared Error (Euclidean distances of each point to its closest centroid)</a:t>
             </a:r>
             <a:endParaRPr lang="en-US" dirty="0"/>
+          </a:p>
+        </p:txBody>
+      </p:sp>
+      <p:sp>
+        <p:nvSpPr>
+          <p:cNvPr id="2" name="TextBox 1">
+            <a:extLst>
+              <a:ext uri="{FF2B5EF4-FFF2-40B4-BE49-F238E27FC236}">
+                <a16:creationId xmlns:a16="http://schemas.microsoft.com/office/drawing/2014/main" id="{5E4BFE8A-6F7C-282A-5C1E-71FE52CFD128}"/>
+              </a:ext>
+            </a:extLst>
+          </p:cNvPr>
+          <p:cNvSpPr txBox="1"/>
+          <p:nvPr/>
+        </p:nvSpPr>
+        <p:spPr>
+          <a:xfrm>
+            <a:off x="6096000" y="6030822"/>
+            <a:ext cx="5205464" cy="369332"/>
+          </a:xfrm>
+          <a:prstGeom prst="rect">
+            <a:avLst/>
+          </a:prstGeom>
+          <a:noFill/>
+        </p:spPr>
+        <p:txBody>
+          <a:bodyPr wrap="none" rtlCol="0">
+            <a:spAutoFit/>
+          </a:bodyPr>
+          <a:lstStyle/>
+          <a:p>
+            <a:r>
+              <a:rPr lang="en-US" dirty="0"/>
+              <a:t>Computationally cheap, but you have to set k yourself</a:t>
+            </a:r>
           </a:p>
         </p:txBody>
       </p:sp>

</xml_diff>